<commit_message>
Wire Diagram fixed, added bootstrap to Carts stuff
</commit_message>
<xml_diff>
--- a/cse135wirediagram.pptx
+++ b/cse135wirediagram.pptx
@@ -4359,73 +4359,57 @@
                   <a:srgbClr val="000000"/>
                 </a:solidFill>
               </a:rPr>
-              <a:t>ignup_confirm</a:t>
-            </a:r>
+              <a:t>ignup_confirm.jsp</a:t>
+            </a:r>
+            <a:endParaRPr lang="en-US" dirty="0">
+              <a:solidFill>
+                <a:srgbClr val="000000"/>
+              </a:solidFill>
+            </a:endParaRPr>
+          </a:p>
+        </p:txBody>
+      </p:sp>
+      <p:sp>
+        <p:nvSpPr>
+          <p:cNvPr id="234" name="Rectangle 233"/>
+          <p:cNvSpPr/>
+          <p:nvPr/>
+        </p:nvSpPr>
+        <p:spPr>
+          <a:xfrm>
+            <a:off x="24279" y="1177883"/>
+            <a:ext cx="1301750" cy="497417"/>
+          </a:xfrm>
+          <a:prstGeom prst="rect">
+            <a:avLst/>
+          </a:prstGeom>
+        </p:spPr>
+        <p:style>
+          <a:lnRef idx="1">
+            <a:schemeClr val="accent1"/>
+          </a:lnRef>
+          <a:fillRef idx="3">
+            <a:schemeClr val="accent1"/>
+          </a:fillRef>
+          <a:effectRef idx="2">
+            <a:schemeClr val="accent1"/>
+          </a:effectRef>
+          <a:fontRef idx="minor">
+            <a:schemeClr val="lt1"/>
+          </a:fontRef>
+        </p:style>
+        <p:txBody>
+          <a:bodyPr rtlCol="0" anchor="ctr"/>
+          <a:lstStyle/>
+          <a:p>
+            <a:pPr algn="ctr"/>
             <a:r>
               <a:rPr lang="en-US" dirty="0" err="1" smtClean="0">
                 <a:solidFill>
                   <a:srgbClr val="000000"/>
                 </a:solidFill>
               </a:rPr>
-              <a:t>.jsp</a:t>
-            </a:r>
-            <a:endParaRPr lang="en-US" dirty="0">
-              <a:solidFill>
-                <a:srgbClr val="000000"/>
-              </a:solidFill>
-            </a:endParaRPr>
-          </a:p>
-        </p:txBody>
-      </p:sp>
-      <p:sp>
-        <p:nvSpPr>
-          <p:cNvPr id="234" name="Rectangle 233"/>
-          <p:cNvSpPr/>
-          <p:nvPr/>
-        </p:nvSpPr>
-        <p:spPr>
-          <a:xfrm>
-            <a:off x="24279" y="1177883"/>
-            <a:ext cx="1301750" cy="497417"/>
-          </a:xfrm>
-          <a:prstGeom prst="rect">
-            <a:avLst/>
-          </a:prstGeom>
-        </p:spPr>
-        <p:style>
-          <a:lnRef idx="1">
-            <a:schemeClr val="accent1"/>
-          </a:lnRef>
-          <a:fillRef idx="3">
-            <a:schemeClr val="accent1"/>
-          </a:fillRef>
-          <a:effectRef idx="2">
-            <a:schemeClr val="accent1"/>
-          </a:effectRef>
-          <a:fontRef idx="minor">
-            <a:schemeClr val="lt1"/>
-          </a:fontRef>
-        </p:style>
-        <p:txBody>
-          <a:bodyPr rtlCol="0" anchor="ctr"/>
-          <a:lstStyle/>
-          <a:p>
-            <a:pPr algn="ctr"/>
-            <a:r>
-              <a:rPr lang="en-US" dirty="0" err="1" smtClean="0">
-                <a:solidFill>
-                  <a:srgbClr val="000000"/>
-                </a:solidFill>
-              </a:rPr>
-              <a:t>signup</a:t>
-            </a:r>
-            <a:r>
-              <a:rPr lang="en-US" dirty="0" err="1" smtClean="0">
-                <a:solidFill>
-                  <a:srgbClr val="000000"/>
-                </a:solidFill>
-              </a:rPr>
-              <a:t>.jsp</a:t>
+              <a:t>signup.jsp</a:t>
             </a:r>
             <a:endParaRPr lang="en-US" dirty="0">
               <a:solidFill>
@@ -4759,7 +4743,7 @@
         </p:nvSpPr>
         <p:spPr>
           <a:xfrm>
-            <a:off x="6751034" y="4863339"/>
+            <a:off x="6877248" y="3858092"/>
             <a:ext cx="2066675" cy="582084"/>
           </a:xfrm>
           <a:prstGeom prst="rect">
@@ -4791,7 +4775,7 @@
                   <a:srgbClr val="000000"/>
                 </a:solidFill>
               </a:rPr>
-              <a:t>products.jsp</a:t>
+              <a:t>categories.jsp</a:t>
             </a:r>
             <a:endParaRPr lang="en-US" dirty="0">
               <a:solidFill>
@@ -4813,7 +4797,7 @@
         <p:spPr>
           <a:xfrm>
             <a:off x="6489172" y="545992"/>
-            <a:ext cx="261862" cy="4608389"/>
+            <a:ext cx="388076" cy="3603142"/>
           </a:xfrm>
           <a:prstGeom prst="straightConnector1">
             <a:avLst/>
@@ -4993,7 +4977,7 @@
         </p:nvCxnSpPr>
         <p:spPr>
           <a:xfrm rot="5400000" flipH="1" flipV="1">
-            <a:off x="8155519" y="4783233"/>
+            <a:off x="8281733" y="3777986"/>
             <a:ext cx="291042" cy="1033337"/>
           </a:xfrm>
           <a:prstGeom prst="curvedConnector4">
@@ -5029,8 +5013,8 @@
         </p:nvSpPr>
         <p:spPr>
           <a:xfrm>
-            <a:off x="7344833" y="5947833"/>
-            <a:ext cx="1703917" cy="369332"/>
+            <a:off x="7910585" y="4540173"/>
+            <a:ext cx="1486724" cy="646331"/>
           </a:xfrm>
           <a:prstGeom prst="rect">
             <a:avLst/>
@@ -5044,13 +5028,176 @@
           <a:lstStyle/>
           <a:p>
             <a:r>
-              <a:rPr lang="en-US" smtClean="0"/>
-              <a:t>?action=…&amp;</a:t>
+              <a:rPr lang="en-US" dirty="0" smtClean="0"/>
+              <a:t>?action=…</a:t>
+            </a:r>
+            <a:r>
+              <a:rPr lang="en-US" dirty="0" smtClean="0"/>
+              <a:t>&amp;keyword=…</a:t>
             </a:r>
             <a:endParaRPr lang="en-US" dirty="0"/>
           </a:p>
         </p:txBody>
       </p:sp>
+      <p:sp>
+        <p:nvSpPr>
+          <p:cNvPr id="50" name="Rectangle 49"/>
+          <p:cNvSpPr/>
+          <p:nvPr/>
+        </p:nvSpPr>
+        <p:spPr>
+          <a:xfrm>
+            <a:off x="6679015" y="5353963"/>
+            <a:ext cx="2066675" cy="582084"/>
+          </a:xfrm>
+          <a:prstGeom prst="rect">
+            <a:avLst/>
+          </a:prstGeom>
+        </p:spPr>
+        <p:style>
+          <a:lnRef idx="1">
+            <a:schemeClr val="accent1"/>
+          </a:lnRef>
+          <a:fillRef idx="3">
+            <a:schemeClr val="accent1"/>
+          </a:fillRef>
+          <a:effectRef idx="2">
+            <a:schemeClr val="accent1"/>
+          </a:effectRef>
+          <a:fontRef idx="minor">
+            <a:schemeClr val="lt1"/>
+          </a:fontRef>
+        </p:style>
+        <p:txBody>
+          <a:bodyPr rtlCol="0" anchor="ctr"/>
+          <a:lstStyle/>
+          <a:p>
+            <a:pPr algn="ctr"/>
+            <a:r>
+              <a:rPr lang="en-US" dirty="0" err="1" smtClean="0">
+                <a:solidFill>
+                  <a:srgbClr val="000000"/>
+                </a:solidFill>
+              </a:rPr>
+              <a:t>products.jsp</a:t>
+            </a:r>
+            <a:endParaRPr lang="en-US" dirty="0">
+              <a:solidFill>
+                <a:srgbClr val="000000"/>
+              </a:solidFill>
+            </a:endParaRPr>
+          </a:p>
+        </p:txBody>
+      </p:sp>
+      <p:cxnSp>
+        <p:nvCxnSpPr>
+          <p:cNvPr id="51" name="Curved Connector 50"/>
+          <p:cNvCxnSpPr>
+            <a:stCxn id="50" idx="2"/>
+            <a:endCxn id="50" idx="3"/>
+          </p:cNvCxnSpPr>
+          <p:nvPr/>
+        </p:nvCxnSpPr>
+        <p:spPr>
+          <a:xfrm rot="5400000" flipH="1" flipV="1">
+            <a:off x="8083500" y="5273857"/>
+            <a:ext cx="291042" cy="1033337"/>
+          </a:xfrm>
+          <a:prstGeom prst="curvedConnector4">
+            <a:avLst>
+              <a:gd name="adj1" fmla="val -78545"/>
+              <a:gd name="adj2" fmla="val 122123"/>
+            </a:avLst>
+          </a:prstGeom>
+          <a:ln>
+            <a:tailEnd type="arrow"/>
+          </a:ln>
+        </p:spPr>
+        <p:style>
+          <a:lnRef idx="2">
+            <a:schemeClr val="accent1"/>
+          </a:lnRef>
+          <a:fillRef idx="0">
+            <a:schemeClr val="accent1"/>
+          </a:fillRef>
+          <a:effectRef idx="1">
+            <a:schemeClr val="accent1"/>
+          </a:effectRef>
+          <a:fontRef idx="minor">
+            <a:schemeClr val="tx1"/>
+          </a:fontRef>
+        </p:style>
+      </p:cxnSp>
+      <p:sp>
+        <p:nvSpPr>
+          <p:cNvPr id="52" name="TextBox 51"/>
+          <p:cNvSpPr txBox="1"/>
+          <p:nvPr/>
+        </p:nvSpPr>
+        <p:spPr>
+          <a:xfrm>
+            <a:off x="7387248" y="6142056"/>
+            <a:ext cx="1486724" cy="646331"/>
+          </a:xfrm>
+          <a:prstGeom prst="rect">
+            <a:avLst/>
+          </a:prstGeom>
+          <a:noFill/>
+        </p:spPr>
+        <p:txBody>
+          <a:bodyPr wrap="square" rtlCol="0">
+            <a:spAutoFit/>
+          </a:bodyPr>
+          <a:lstStyle/>
+          <a:p>
+            <a:r>
+              <a:rPr lang="en-US" dirty="0" smtClean="0"/>
+              <a:t>?action=…</a:t>
+            </a:r>
+            <a:r>
+              <a:rPr lang="en-US" dirty="0" smtClean="0"/>
+              <a:t>&amp;keyword=…</a:t>
+            </a:r>
+            <a:endParaRPr lang="en-US" dirty="0"/>
+          </a:p>
+        </p:txBody>
+      </p:sp>
+      <p:cxnSp>
+        <p:nvCxnSpPr>
+          <p:cNvPr id="54" name="Straight Arrow Connector 53"/>
+          <p:cNvCxnSpPr>
+            <a:stCxn id="285" idx="2"/>
+            <a:endCxn id="50" idx="0"/>
+          </p:cNvCxnSpPr>
+          <p:nvPr/>
+        </p:nvCxnSpPr>
+        <p:spPr>
+          <a:xfrm flipH="1">
+            <a:off x="7712353" y="4440176"/>
+            <a:ext cx="198233" cy="913787"/>
+          </a:xfrm>
+          <a:prstGeom prst="straightConnector1">
+            <a:avLst/>
+          </a:prstGeom>
+          <a:ln>
+            <a:tailEnd type="arrow"/>
+          </a:ln>
+        </p:spPr>
+        <p:style>
+          <a:lnRef idx="2">
+            <a:schemeClr val="accent1"/>
+          </a:lnRef>
+          <a:fillRef idx="0">
+            <a:schemeClr val="accent1"/>
+          </a:fillRef>
+          <a:effectRef idx="1">
+            <a:schemeClr val="accent1"/>
+          </a:effectRef>
+          <a:fontRef idx="minor">
+            <a:schemeClr val="tx1"/>
+          </a:fontRef>
+        </p:style>
+      </p:cxnSp>
     </p:spTree>
     <p:extLst>
       <p:ext uri="{BB962C8B-B14F-4D97-AF65-F5344CB8AC3E}">

</xml_diff>